<commit_message>
update gui test app
</commit_message>
<xml_diff>
--- a/temp/wrpbase_setup.pptx
+++ b/temp/wrpbase_setup.pptx
@@ -41,7 +41,8 @@
     <p:sldId id="285" r:id="rId35"/>
     <p:sldId id="282" r:id="rId36"/>
     <p:sldId id="300" r:id="rId37"/>
-    <p:sldId id="260" r:id="rId38"/>
+    <p:sldId id="301" r:id="rId38"/>
+    <p:sldId id="260" r:id="rId39"/>
   </p:sldIdLst>
   <p:sldSz cx="12192000" cy="6858000"/>
   <p:notesSz cx="6858000" cy="9144000"/>
@@ -374,7 +375,7 @@
           <a:p>
             <a:fld id="{9FF0BE47-2AD4-4060-BC4E-4D430C7DA142}" type="datetimeFigureOut">
               <a:rPr lang="en-US" smtClean="0"/>
-              <a:t>8/13/2020</a:t>
+              <a:t>9/29/2020</a:t>
             </a:fld>
             <a:endParaRPr lang="en-US"/>
           </a:p>
@@ -587,7 +588,7 @@
           <a:p>
             <a:fld id="{9FF0BE47-2AD4-4060-BC4E-4D430C7DA142}" type="datetimeFigureOut">
               <a:rPr lang="en-US" smtClean="0"/>
-              <a:t>8/13/2020</a:t>
+              <a:t>9/29/2020</a:t>
             </a:fld>
             <a:endParaRPr lang="en-US"/>
           </a:p>
@@ -843,7 +844,7 @@
           <a:p>
             <a:fld id="{9FF0BE47-2AD4-4060-BC4E-4D430C7DA142}" type="datetimeFigureOut">
               <a:rPr lang="en-US" smtClean="0"/>
-              <a:t>8/13/2020</a:t>
+              <a:t>9/29/2020</a:t>
             </a:fld>
             <a:endParaRPr lang="en-US"/>
           </a:p>
@@ -1017,7 +1018,7 @@
           <a:p>
             <a:fld id="{9FF0BE47-2AD4-4060-BC4E-4D430C7DA142}" type="datetimeFigureOut">
               <a:rPr lang="en-US" smtClean="0"/>
-              <a:t>8/13/2020</a:t>
+              <a:t>9/29/2020</a:t>
             </a:fld>
             <a:endParaRPr lang="en-US"/>
           </a:p>
@@ -1360,7 +1361,7 @@
           <a:p>
             <a:fld id="{9FF0BE47-2AD4-4060-BC4E-4D430C7DA142}" type="datetimeFigureOut">
               <a:rPr lang="en-US" smtClean="0"/>
-              <a:t>8/13/2020</a:t>
+              <a:t>9/29/2020</a:t>
             </a:fld>
             <a:endParaRPr lang="en-US"/>
           </a:p>
@@ -1635,7 +1636,7 @@
           <a:p>
             <a:fld id="{9FF0BE47-2AD4-4060-BC4E-4D430C7DA142}" type="datetimeFigureOut">
               <a:rPr lang="en-US" smtClean="0"/>
-              <a:t>8/13/2020</a:t>
+              <a:t>9/29/2020</a:t>
             </a:fld>
             <a:endParaRPr lang="en-US"/>
           </a:p>
@@ -2014,7 +2015,7 @@
           <a:p>
             <a:fld id="{9FF0BE47-2AD4-4060-BC4E-4D430C7DA142}" type="datetimeFigureOut">
               <a:rPr lang="en-US" smtClean="0"/>
-              <a:t>8/13/2020</a:t>
+              <a:t>9/29/2020</a:t>
             </a:fld>
             <a:endParaRPr lang="en-US"/>
           </a:p>
@@ -2132,7 +2133,7 @@
           <a:p>
             <a:fld id="{9FF0BE47-2AD4-4060-BC4E-4D430C7DA142}" type="datetimeFigureOut">
               <a:rPr lang="en-US" smtClean="0"/>
-              <a:t>8/13/2020</a:t>
+              <a:t>9/29/2020</a:t>
             </a:fld>
             <a:endParaRPr lang="en-US"/>
           </a:p>
@@ -2303,7 +2304,7 @@
           <a:p>
             <a:fld id="{9FF0BE47-2AD4-4060-BC4E-4D430C7DA142}" type="datetimeFigureOut">
               <a:rPr lang="en-US" smtClean="0"/>
-              <a:t>8/13/2020</a:t>
+              <a:t>9/29/2020</a:t>
             </a:fld>
             <a:endParaRPr lang="en-US"/>
           </a:p>
@@ -2662,7 +2663,7 @@
           <a:p>
             <a:fld id="{9FF0BE47-2AD4-4060-BC4E-4D430C7DA142}" type="datetimeFigureOut">
               <a:rPr lang="en-US" smtClean="0"/>
-              <a:t>8/13/2020</a:t>
+              <a:t>9/29/2020</a:t>
             </a:fld>
             <a:endParaRPr lang="en-US"/>
           </a:p>
@@ -3044,7 +3045,7 @@
           <a:p>
             <a:fld id="{9FF0BE47-2AD4-4060-BC4E-4D430C7DA142}" type="datetimeFigureOut">
               <a:rPr lang="en-US" smtClean="0"/>
-              <a:t>8/13/2020</a:t>
+              <a:t>9/29/2020</a:t>
             </a:fld>
             <a:endParaRPr lang="en-US"/>
           </a:p>
@@ -3331,7 +3332,7 @@
           <a:p>
             <a:fld id="{9FF0BE47-2AD4-4060-BC4E-4D430C7DA142}" type="datetimeFigureOut">
               <a:rPr lang="en-US" smtClean="0"/>
-              <a:t>8/13/2020</a:t>
+              <a:t>9/29/2020</a:t>
             </a:fld>
             <a:endParaRPr lang="en-US"/>
           </a:p>
@@ -9594,7 +9595,7 @@
           <a:p>
             <a:r>
               <a:rPr lang="en-US" dirty="0" smtClean="0"/>
-              <a:t>References</a:t>
+              <a:t>USB2UART Bridge</a:t>
             </a:r>
             <a:endParaRPr lang="en-US" dirty="0"/>
           </a:p>
@@ -9616,10 +9617,6 @@
           <a:lstStyle/>
           <a:p>
             <a:r>
-              <a:rPr lang="en-US" dirty="0"/>
-              <a:t>LVGL: </a:t>
-            </a:r>
-            <a:r>
               <a:rPr lang="en-US" dirty="0">
                 <a:hlinkClick r:id="rId2"/>
               </a:rPr>
@@ -9629,6 +9626,97 @@
               <a:rPr lang="en-US" dirty="0" smtClean="0">
                 <a:hlinkClick r:id="rId2"/>
               </a:rPr>
+              <a:t>docs.espressif.com/projects/esp-idf/en/latest/esp32/get-started/establish-serial-connection.html</a:t>
+            </a:r>
+            <a:endParaRPr lang="en-US" dirty="0" smtClean="0"/>
+          </a:p>
+          <a:p>
+            <a:endParaRPr lang="en-US" dirty="0"/>
+          </a:p>
+        </p:txBody>
+      </p:sp>
+    </p:spTree>
+    <p:extLst>
+      <p:ext uri="{BB962C8B-B14F-4D97-AF65-F5344CB8AC3E}">
+        <p14:creationId xmlns:p14="http://schemas.microsoft.com/office/powerpoint/2010/main" val="2884080499"/>
+      </p:ext>
+    </p:extLst>
+  </p:cSld>
+  <p:clrMapOvr>
+    <a:masterClrMapping/>
+  </p:clrMapOvr>
+</p:sld>
+</file>
+
+<file path=ppt/slides/slide38.xml><?xml version="1.0" encoding="utf-8"?>
+<p:sld xmlns:a="http://schemas.openxmlformats.org/drawingml/2006/main" xmlns:r="http://schemas.openxmlformats.org/officeDocument/2006/relationships" xmlns:p="http://schemas.openxmlformats.org/presentationml/2006/main">
+  <p:cSld>
+    <p:spTree>
+      <p:nvGrpSpPr>
+        <p:cNvPr id="1" name=""/>
+        <p:cNvGrpSpPr/>
+        <p:nvPr/>
+      </p:nvGrpSpPr>
+      <p:grpSpPr>
+        <a:xfrm>
+          <a:off x="0" y="0"/>
+          <a:ext cx="0" cy="0"/>
+          <a:chOff x="0" y="0"/>
+          <a:chExt cx="0" cy="0"/>
+        </a:xfrm>
+      </p:grpSpPr>
+      <p:sp>
+        <p:nvSpPr>
+          <p:cNvPr id="2" name="Title 1"/>
+          <p:cNvSpPr>
+            <a:spLocks noGrp="1"/>
+          </p:cNvSpPr>
+          <p:nvPr>
+            <p:ph type="title"/>
+          </p:nvPr>
+        </p:nvSpPr>
+        <p:spPr/>
+        <p:txBody>
+          <a:bodyPr/>
+          <a:lstStyle/>
+          <a:p>
+            <a:r>
+              <a:rPr lang="en-US" dirty="0" smtClean="0"/>
+              <a:t>References</a:t>
+            </a:r>
+            <a:endParaRPr lang="en-US" dirty="0"/>
+          </a:p>
+        </p:txBody>
+      </p:sp>
+      <p:sp>
+        <p:nvSpPr>
+          <p:cNvPr id="3" name="Content Placeholder 2"/>
+          <p:cNvSpPr>
+            <a:spLocks noGrp="1"/>
+          </p:cNvSpPr>
+          <p:nvPr>
+            <p:ph idx="1"/>
+          </p:nvPr>
+        </p:nvSpPr>
+        <p:spPr/>
+        <p:txBody>
+          <a:bodyPr/>
+          <a:lstStyle/>
+          <a:p>
+            <a:r>
+              <a:rPr lang="en-US" dirty="0"/>
+              <a:t>LVGL: </a:t>
+            </a:r>
+            <a:r>
+              <a:rPr lang="en-US" dirty="0">
+                <a:hlinkClick r:id="rId2"/>
+              </a:rPr>
+              <a:t>https://</a:t>
+            </a:r>
+            <a:r>
+              <a:rPr lang="en-US" dirty="0" smtClean="0">
+                <a:hlinkClick r:id="rId2"/>
+              </a:rPr>
               <a:t>github.com/littlevgl/lvgl</a:t>
             </a:r>
             <a:endParaRPr lang="en-US" dirty="0" smtClean="0"/>
@@ -9671,23 +9759,11 @@
             </a:r>
             <a:r>
               <a:rPr lang="en-US" dirty="0" smtClean="0"/>
-              <a:t>, </a:t>
-            </a:r>
-            <a:r>
-              <a:rPr lang="en-US" dirty="0" smtClean="0"/>
-              <a:t>Composite, Singleton</a:t>
-            </a:r>
-            <a:r>
-              <a:rPr lang="en-US" dirty="0" smtClean="0"/>
-              <a:t>, Command, </a:t>
+              <a:t>, Composite, Singleton, Command, </a:t>
             </a:r>
             <a:r>
               <a:rPr lang="en-US" smtClean="0"/>
-              <a:t>Observer</a:t>
-            </a:r>
-            <a:r>
-              <a:rPr lang="en-US" smtClean="0"/>
-              <a:t>, State, </a:t>
+              <a:t>Observer, State, </a:t>
             </a:r>
             <a:r>
               <a:rPr lang="en-US" dirty="0" smtClean="0"/>

</xml_diff>